<commit_message>
Back this up on github
</commit_message>
<xml_diff>
--- a/presentation.pptx
+++ b/presentation.pptx
@@ -1105,10 +1105,24 @@
     <dgm:pt modelId="{FF1D8F2C-7729-414B-933C-789AA665DB74}" type="pres">
       <dgm:prSet presAssocID="{3F1ED324-4185-2448-B3F9-73678BC17CFF}" presName="sibTrans" presStyleLbl="sibTrans2D1" presStyleIdx="0" presStyleCnt="4"/>
       <dgm:spPr/>
+      <dgm:t>
+        <a:bodyPr/>
+        <a:lstStyle/>
+        <a:p>
+          <a:endParaRPr lang="en-US"/>
+        </a:p>
+      </dgm:t>
     </dgm:pt>
     <dgm:pt modelId="{D6BB6B03-51A2-174A-898E-0C739FB63056}" type="pres">
       <dgm:prSet presAssocID="{3F1ED324-4185-2448-B3F9-73678BC17CFF}" presName="connectorText" presStyleLbl="sibTrans2D1" presStyleIdx="0" presStyleCnt="4"/>
       <dgm:spPr/>
+      <dgm:t>
+        <a:bodyPr/>
+        <a:lstStyle/>
+        <a:p>
+          <a:endParaRPr lang="en-US"/>
+        </a:p>
+      </dgm:t>
     </dgm:pt>
     <dgm:pt modelId="{CA8D90C2-BA69-3744-A20C-0454CEB5BBA8}" type="pres">
       <dgm:prSet presAssocID="{C7ACAE0B-42D7-844C-9614-2C70059EE22A}" presName="node" presStyleLbl="node1" presStyleIdx="1" presStyleCnt="5" custScaleX="229298" custScaleY="186936" custLinFactX="21655" custLinFactY="-38523" custLinFactNeighborX="100000" custLinFactNeighborY="-100000">
@@ -1128,10 +1142,24 @@
     <dgm:pt modelId="{FF8EFEB4-B6C5-8146-8C69-10341F1046B6}" type="pres">
       <dgm:prSet presAssocID="{91A47F4F-9E33-8541-8F61-2D95090CFB0E}" presName="sibTrans" presStyleLbl="sibTrans2D1" presStyleIdx="1" presStyleCnt="4"/>
       <dgm:spPr/>
+      <dgm:t>
+        <a:bodyPr/>
+        <a:lstStyle/>
+        <a:p>
+          <a:endParaRPr lang="en-US"/>
+        </a:p>
+      </dgm:t>
     </dgm:pt>
     <dgm:pt modelId="{79C1617F-3B2A-E44F-A8E6-40883D43E8BD}" type="pres">
       <dgm:prSet presAssocID="{91A47F4F-9E33-8541-8F61-2D95090CFB0E}" presName="connectorText" presStyleLbl="sibTrans2D1" presStyleIdx="1" presStyleCnt="4"/>
       <dgm:spPr/>
+      <dgm:t>
+        <a:bodyPr/>
+        <a:lstStyle/>
+        <a:p>
+          <a:endParaRPr lang="en-US"/>
+        </a:p>
+      </dgm:t>
     </dgm:pt>
     <dgm:pt modelId="{5F447B3D-91D9-9641-AA91-BBFEA9D37B71}" type="pres">
       <dgm:prSet presAssocID="{98A25245-ED48-EC48-9D65-CF9F2451611C}" presName="node" presStyleLbl="node1" presStyleIdx="2" presStyleCnt="5" custScaleX="229298" custScaleY="186936" custLinFactX="64423" custLinFactY="-38523" custLinFactNeighborX="100000" custLinFactNeighborY="-100000">
@@ -1151,10 +1179,24 @@
     <dgm:pt modelId="{C3199361-0263-814C-9E55-2E5FE23350C2}" type="pres">
       <dgm:prSet presAssocID="{CD14BEA5-633A-D247-9086-DB784175D0FE}" presName="sibTrans" presStyleLbl="sibTrans2D1" presStyleIdx="2" presStyleCnt="4"/>
       <dgm:spPr/>
+      <dgm:t>
+        <a:bodyPr/>
+        <a:lstStyle/>
+        <a:p>
+          <a:endParaRPr lang="en-US"/>
+        </a:p>
+      </dgm:t>
     </dgm:pt>
     <dgm:pt modelId="{CF794C3E-5D81-D840-838D-C1182D94A585}" type="pres">
       <dgm:prSet presAssocID="{CD14BEA5-633A-D247-9086-DB784175D0FE}" presName="connectorText" presStyleLbl="sibTrans2D1" presStyleIdx="2" presStyleCnt="4"/>
       <dgm:spPr/>
+      <dgm:t>
+        <a:bodyPr/>
+        <a:lstStyle/>
+        <a:p>
+          <a:endParaRPr lang="en-US"/>
+        </a:p>
+      </dgm:t>
     </dgm:pt>
     <dgm:pt modelId="{D43DCB50-6D4B-0649-9DE1-F76C58773865}" type="pres">
       <dgm:prSet presAssocID="{8A4E21F5-AEE5-A646-86AF-416F2F799973}" presName="node" presStyleLbl="node1" presStyleIdx="3" presStyleCnt="5" custScaleX="229298" custScaleY="186936" custLinFactX="154935" custLinFactNeighborX="200000" custLinFactNeighborY="-10893">
@@ -1174,10 +1216,24 @@
     <dgm:pt modelId="{10F8498C-E24E-0F40-B316-2BDB8694A360}" type="pres">
       <dgm:prSet presAssocID="{611A041E-B663-3D41-AED2-662E98DA7FD3}" presName="sibTrans" presStyleLbl="sibTrans2D1" presStyleIdx="3" presStyleCnt="4"/>
       <dgm:spPr/>
+      <dgm:t>
+        <a:bodyPr/>
+        <a:lstStyle/>
+        <a:p>
+          <a:endParaRPr lang="en-US"/>
+        </a:p>
+      </dgm:t>
     </dgm:pt>
     <dgm:pt modelId="{4ED1294D-FA64-0643-BFB9-F8F2B19A73EA}" type="pres">
       <dgm:prSet presAssocID="{611A041E-B663-3D41-AED2-662E98DA7FD3}" presName="connectorText" presStyleLbl="sibTrans2D1" presStyleIdx="3" presStyleCnt="4"/>
       <dgm:spPr/>
+      <dgm:t>
+        <a:bodyPr/>
+        <a:lstStyle/>
+        <a:p>
+          <a:endParaRPr lang="en-US"/>
+        </a:p>
+      </dgm:t>
     </dgm:pt>
     <dgm:pt modelId="{5DB57F4E-E499-6F49-A9B3-1791519076CC}" type="pres">
       <dgm:prSet presAssocID="{4CB4D715-1902-ED41-A393-042F813D1064}" presName="node" presStyleLbl="node1" presStyleIdx="4" presStyleCnt="5" custScaleX="229298" custScaleY="186936" custLinFactX="-310005" custLinFactY="72097" custLinFactNeighborX="-400000" custLinFactNeighborY="100000">
@@ -1202,11 +1258,11 @@
     <dgm:cxn modelId="{E294FC66-E8EE-1A4D-BA34-1D17691DE4E3}" type="presOf" srcId="{91A47F4F-9E33-8541-8F61-2D95090CFB0E}" destId="{FF8EFEB4-B6C5-8146-8C69-10341F1046B6}" srcOrd="0" destOrd="0" presId="urn:microsoft.com/office/officeart/2005/8/layout/process1"/>
     <dgm:cxn modelId="{7FB37121-7956-CB41-8C34-BC3220812C29}" type="presOf" srcId="{3F1ED324-4185-2448-B3F9-73678BC17CFF}" destId="{D6BB6B03-51A2-174A-898E-0C739FB63056}" srcOrd="1" destOrd="0" presId="urn:microsoft.com/office/officeart/2005/8/layout/process1"/>
     <dgm:cxn modelId="{4F70B6E7-7119-104F-96F9-7BBA235A5AAB}" type="presOf" srcId="{98A25245-ED48-EC48-9D65-CF9F2451611C}" destId="{5F447B3D-91D9-9641-AA91-BBFEA9D37B71}" srcOrd="0" destOrd="0" presId="urn:microsoft.com/office/officeart/2005/8/layout/process1"/>
+    <dgm:cxn modelId="{6A7A7ACA-A326-3247-96C2-C39F5C0F2509}" type="presOf" srcId="{611A041E-B663-3D41-AED2-662E98DA7FD3}" destId="{4ED1294D-FA64-0643-BFB9-F8F2B19A73EA}" srcOrd="1" destOrd="0" presId="urn:microsoft.com/office/officeart/2005/8/layout/process1"/>
+    <dgm:cxn modelId="{95C2F015-2B2C-2C4A-88C0-F22E26F75FA7}" type="presOf" srcId="{4CB4D715-1902-ED41-A393-042F813D1064}" destId="{5DB57F4E-E499-6F49-A9B3-1791519076CC}" srcOrd="0" destOrd="0" presId="urn:microsoft.com/office/officeart/2005/8/layout/process1"/>
     <dgm:cxn modelId="{30507065-C8CA-B343-A4D4-68F8DB048DF8}" type="presOf" srcId="{C0492E5A-A9DD-0A45-A06C-84D7CA5ED048}" destId="{539E0DA5-C97E-7348-A8A8-21611334F2FB}" srcOrd="0" destOrd="0" presId="urn:microsoft.com/office/officeart/2005/8/layout/process1"/>
-    <dgm:cxn modelId="{95C2F015-2B2C-2C4A-88C0-F22E26F75FA7}" type="presOf" srcId="{4CB4D715-1902-ED41-A393-042F813D1064}" destId="{5DB57F4E-E499-6F49-A9B3-1791519076CC}" srcOrd="0" destOrd="0" presId="urn:microsoft.com/office/officeart/2005/8/layout/process1"/>
-    <dgm:cxn modelId="{6A7A7ACA-A326-3247-96C2-C39F5C0F2509}" type="presOf" srcId="{611A041E-B663-3D41-AED2-662E98DA7FD3}" destId="{4ED1294D-FA64-0643-BFB9-F8F2B19A73EA}" srcOrd="1" destOrd="0" presId="urn:microsoft.com/office/officeart/2005/8/layout/process1"/>
+    <dgm:cxn modelId="{1ECBF77B-35FF-9B4F-8FEA-145C93829473}" srcId="{E77F4731-5214-3E4A-BBFE-45921ECBCD1F}" destId="{C7ACAE0B-42D7-844C-9614-2C70059EE22A}" srcOrd="1" destOrd="0" parTransId="{592EBC40-8179-4F4D-87D5-AD9C3C8BD7F7}" sibTransId="{91A47F4F-9E33-8541-8F61-2D95090CFB0E}"/>
     <dgm:cxn modelId="{0F036EB9-BFB2-AF4B-AA2F-21BDB2676F6A}" type="presOf" srcId="{91A47F4F-9E33-8541-8F61-2D95090CFB0E}" destId="{79C1617F-3B2A-E44F-A8E6-40883D43E8BD}" srcOrd="1" destOrd="0" presId="urn:microsoft.com/office/officeart/2005/8/layout/process1"/>
-    <dgm:cxn modelId="{1ECBF77B-35FF-9B4F-8FEA-145C93829473}" srcId="{E77F4731-5214-3E4A-BBFE-45921ECBCD1F}" destId="{C7ACAE0B-42D7-844C-9614-2C70059EE22A}" srcOrd="1" destOrd="0" parTransId="{592EBC40-8179-4F4D-87D5-AD9C3C8BD7F7}" sibTransId="{91A47F4F-9E33-8541-8F61-2D95090CFB0E}"/>
     <dgm:cxn modelId="{B59055A9-072D-D040-B588-E881A8936DC3}" srcId="{E77F4731-5214-3E4A-BBFE-45921ECBCD1F}" destId="{4CB4D715-1902-ED41-A393-042F813D1064}" srcOrd="4" destOrd="0" parTransId="{4E1B9869-CABF-6A48-A60F-930580A2689C}" sibTransId="{1F48CD12-3482-9B45-BC10-8699953A05EE}"/>
     <dgm:cxn modelId="{0456711F-D280-B644-B21C-AD427571943A}" type="presOf" srcId="{C7ACAE0B-42D7-844C-9614-2C70059EE22A}" destId="{CA8D90C2-BA69-3744-A20C-0454CEB5BBA8}" srcOrd="0" destOrd="0" presId="urn:microsoft.com/office/officeart/2005/8/layout/process1"/>
     <dgm:cxn modelId="{ACB471E3-7B96-DE40-96FD-6D57C6A9B46C}" srcId="{E77F4731-5214-3E4A-BBFE-45921ECBCD1F}" destId="{C0492E5A-A9DD-0A45-A06C-84D7CA5ED048}" srcOrd="0" destOrd="0" parTransId="{78C56508-3C73-8842-93EF-D8FE71FB2556}" sibTransId="{3F1ED324-4185-2448-B3F9-73678BC17CFF}"/>
@@ -3559,7 +3615,7 @@
           <a:p>
             <a:fld id="{04BCC682-90BF-4B4E-BE8D-697423D0D978}" type="datetimeFigureOut">
               <a:rPr lang="en-US" smtClean="0"/>
-              <a:t>3/27/13</a:t>
+              <a:t>3/28/13</a:t>
             </a:fld>
             <a:endParaRPr lang="en-US"/>
           </a:p>
@@ -4521,11 +4577,30 @@
           <a:p>
             <a:r>
               <a:rPr lang="en-US" dirty="0" smtClean="0"/>
-              <a:t>Talk</a:t>
+              <a:t>We’ve learned that a dumber</a:t>
             </a:r>
             <a:r>
               <a:rPr lang="en-US" baseline="0" dirty="0" smtClean="0"/>
-              <a:t> about attributes</a:t>
+              <a:t> algorithm with more features is better than a clever algorithm with less data.</a:t>
+            </a:r>
+          </a:p>
+          <a:p>
+            <a:endParaRPr lang="en-US" baseline="0" dirty="0" smtClean="0"/>
+          </a:p>
+          <a:p>
+            <a:r>
+              <a:rPr lang="en-US" baseline="0" dirty="0" smtClean="0"/>
+              <a:t>Local == keywords in each bag of words field</a:t>
+            </a:r>
+          </a:p>
+          <a:p>
+            <a:r>
+              <a:rPr lang="en-US" baseline="0" dirty="0" smtClean="0"/>
+              <a:t>Global == top 500 keywords from every bag of words field in all </a:t>
+            </a:r>
+            <a:r>
+              <a:rPr lang="en-US" baseline="0" smtClean="0"/>
+              <a:t>training instances</a:t>
             </a:r>
             <a:endParaRPr lang="en-US" dirty="0"/>
           </a:p>
@@ -5734,7 +5809,7 @@
             <a:fld id="{23A271A1-F6D6-438B-A432-4747EE7ECD40}" type="datetimeFigureOut">
               <a:rPr lang="en-US" smtClean="0"/>
               <a:pPr algn="ctr" eaLnBrk="1" latinLnBrk="0" hangingPunct="1"/>
-              <a:t>3/27/13</a:t>
+              <a:t>3/28/13</a:t>
             </a:fld>
             <a:endParaRPr lang="en-US" sz="2000" dirty="0">
               <a:solidFill>
@@ -5916,7 +5991,7 @@
             <a:fld id="{23A271A1-F6D6-438B-A432-4747EE7ECD40}" type="datetimeFigureOut">
               <a:rPr lang="en-US" smtClean="0"/>
               <a:pPr eaLnBrk="1" latinLnBrk="0" hangingPunct="1"/>
-              <a:t>3/27/13</a:t>
+              <a:t>3/28/13</a:t>
             </a:fld>
             <a:endParaRPr lang="en-US"/>
           </a:p>
@@ -6094,7 +6169,7 @@
             <a:fld id="{23A271A1-F6D6-438B-A432-4747EE7ECD40}" type="datetimeFigureOut">
               <a:rPr lang="en-US" smtClean="0"/>
               <a:pPr eaLnBrk="1" latinLnBrk="0" hangingPunct="1"/>
-              <a:t>3/27/13</a:t>
+              <a:t>3/28/13</a:t>
             </a:fld>
             <a:endParaRPr lang="en-US" dirty="0"/>
           </a:p>
@@ -6262,7 +6337,7 @@
             <a:fld id="{23A271A1-F6D6-438B-A432-4747EE7ECD40}" type="datetimeFigureOut">
               <a:rPr lang="en-US" smtClean="0"/>
               <a:pPr eaLnBrk="1" latinLnBrk="0" hangingPunct="1"/>
-              <a:t>3/27/13</a:t>
+              <a:t>3/28/13</a:t>
             </a:fld>
             <a:endParaRPr lang="en-US" dirty="0"/>
           </a:p>
@@ -6526,7 +6601,7 @@
             <a:fld id="{23A271A1-F6D6-438B-A432-4747EE7ECD40}" type="datetimeFigureOut">
               <a:rPr lang="en-US" smtClean="0"/>
               <a:pPr eaLnBrk="1" latinLnBrk="0" hangingPunct="1"/>
-              <a:t>3/27/13</a:t>
+              <a:t>3/28/13</a:t>
             </a:fld>
             <a:endParaRPr lang="en-US"/>
           </a:p>
@@ -6674,7 +6749,7 @@
             <a:fld id="{23A271A1-F6D6-438B-A432-4747EE7ECD40}" type="datetimeFigureOut">
               <a:rPr lang="en-US" smtClean="0"/>
               <a:pPr eaLnBrk="1" latinLnBrk="0" hangingPunct="1"/>
-              <a:t>3/27/13</a:t>
+              <a:t>3/28/13</a:t>
             </a:fld>
             <a:endParaRPr lang="en-US"/>
           </a:p>
@@ -7328,7 +7403,7 @@
             <a:fld id="{23A271A1-F6D6-438B-A432-4747EE7ECD40}" type="datetimeFigureOut">
               <a:rPr lang="en-US" smtClean="0"/>
               <a:pPr eaLnBrk="1" latinLnBrk="0" hangingPunct="1"/>
-              <a:t>3/27/13</a:t>
+              <a:t>3/28/13</a:t>
             </a:fld>
             <a:endParaRPr lang="en-US"/>
           </a:p>
@@ -7445,7 +7520,7 @@
             <a:fld id="{23A271A1-F6D6-438B-A432-4747EE7ECD40}" type="datetimeFigureOut">
               <a:rPr lang="en-US" smtClean="0"/>
               <a:pPr eaLnBrk="1" latinLnBrk="0" hangingPunct="1"/>
-              <a:t>3/27/13</a:t>
+              <a:t>3/28/13</a:t>
             </a:fld>
             <a:endParaRPr lang="en-US"/>
           </a:p>
@@ -7542,7 +7617,7 @@
             <a:fld id="{23A271A1-F6D6-438B-A432-4747EE7ECD40}" type="datetimeFigureOut">
               <a:rPr lang="en-US" smtClean="0"/>
               <a:pPr eaLnBrk="1" latinLnBrk="0" hangingPunct="1"/>
-              <a:t>3/27/13</a:t>
+              <a:t>3/28/13</a:t>
             </a:fld>
             <a:endParaRPr lang="en-US"/>
           </a:p>
@@ -7839,7 +7914,7 @@
             <a:fld id="{23A271A1-F6D6-438B-A432-4747EE7ECD40}" type="datetimeFigureOut">
               <a:rPr lang="en-US" smtClean="0"/>
               <a:pPr eaLnBrk="1" latinLnBrk="0" hangingPunct="1"/>
-              <a:t>3/27/13</a:t>
+              <a:t>3/28/13</a:t>
             </a:fld>
             <a:endParaRPr lang="en-US"/>
           </a:p>
@@ -8165,7 +8240,7 @@
             <a:fld id="{23A271A1-F6D6-438B-A432-4747EE7ECD40}" type="datetimeFigureOut">
               <a:rPr lang="en-US" smtClean="0"/>
               <a:pPr eaLnBrk="1" latinLnBrk="0" hangingPunct="1"/>
-              <a:t>3/27/13</a:t>
+              <a:t>3/28/13</a:t>
             </a:fld>
             <a:endParaRPr lang="en-US"/>
           </a:p>
@@ -8626,7 +8701,7 @@
             <a:fld id="{23A271A1-F6D6-438B-A432-4747EE7ECD40}" type="datetimeFigureOut">
               <a:rPr lang="en-US" smtClean="0"/>
               <a:pPr eaLnBrk="1" latinLnBrk="0" hangingPunct="1"/>
-              <a:t>3/27/13</a:t>
+              <a:t>3/28/13</a:t>
             </a:fld>
             <a:endParaRPr lang="en-US" sz="1400" dirty="0">
               <a:solidFill>
@@ -9181,7 +9256,19 @@
             </a:r>
             <a:r>
               <a:rPr lang="en-US" dirty="0" smtClean="0"/>
-              <a:t> Job Salary prediction Competition</a:t>
+              <a:t> Job </a:t>
+            </a:r>
+            <a:r>
+              <a:rPr lang="en-US" smtClean="0"/>
+              <a:t>Salary </a:t>
+            </a:r>
+            <a:r>
+              <a:rPr lang="en-US" smtClean="0"/>
+              <a:t>Prediction </a:t>
+            </a:r>
+            <a:r>
+              <a:rPr lang="en-US" dirty="0" smtClean="0"/>
+              <a:t>Competition</a:t>
             </a:r>
             <a:endParaRPr lang="en-US" dirty="0"/>
           </a:p>
@@ -10094,14 +10181,14 @@
             <p:ph idx="1"/>
             <p:extLst>
               <p:ext uri="{D42A27DB-BD31-4B8C-83A1-F6EECF244321}">
-                <p14:modId xmlns:p14="http://schemas.microsoft.com/office/powerpoint/2010/main" val="3908186449"/>
+                <p14:modId xmlns:p14="http://schemas.microsoft.com/office/powerpoint/2010/main" val="435827138"/>
               </p:ext>
             </p:extLst>
           </p:nvPr>
         </p:nvGraphicFramePr>
         <p:xfrm>
           <a:off x="685800" y="2005559"/>
-          <a:ext cx="7543800" cy="1483360"/>
+          <a:ext cx="7543800" cy="1854200"/>
         </p:xfrm>
         <a:graphic>
           <a:graphicData uri="http://schemas.openxmlformats.org/drawingml/2006/table">
@@ -10254,7 +10341,7 @@
                     <a:p>
                       <a:r>
                         <a:rPr lang="en-US" dirty="0" smtClean="0"/>
-                        <a:t>Keywords</a:t>
+                        <a:t>Keywords (local)</a:t>
                       </a:r>
                       <a:endParaRPr lang="en-US" dirty="0"/>
                     </a:p>
@@ -10283,6 +10370,50 @@
                       <a:r>
                         <a:rPr lang="en-US" dirty="0" smtClean="0"/>
                         <a:t>7744.84</a:t>
+                      </a:r>
+                      <a:endParaRPr lang="en-US" dirty="0"/>
+                    </a:p>
+                  </a:txBody>
+                  <a:tcPr/>
+                </a:tc>
+              </a:tr>
+              <a:tr h="370840">
+                <a:tc>
+                  <a:txBody>
+                    <a:bodyPr/>
+                    <a:lstStyle/>
+                    <a:p>
+                      <a:r>
+                        <a:rPr lang="en-US" dirty="0" smtClean="0"/>
+                        <a:t>Keywords (global)</a:t>
+                      </a:r>
+                      <a:endParaRPr lang="en-US" dirty="0"/>
+                    </a:p>
+                  </a:txBody>
+                  <a:tcPr/>
+                </a:tc>
+                <a:tc>
+                  <a:txBody>
+                    <a:bodyPr/>
+                    <a:lstStyle/>
+                    <a:p>
+                      <a:r>
+                        <a:rPr lang="en-US" dirty="0" smtClean="0"/>
+                        <a:t>8360.31</a:t>
+                      </a:r>
+                      <a:endParaRPr lang="en-US" dirty="0"/>
+                    </a:p>
+                  </a:txBody>
+                  <a:tcPr/>
+                </a:tc>
+                <a:tc>
+                  <a:txBody>
+                    <a:bodyPr/>
+                    <a:lstStyle/>
+                    <a:p>
+                      <a:r>
+                        <a:rPr lang="en-US" dirty="0" smtClean="0"/>
+                        <a:t>8135.83</a:t>
                       </a:r>
                       <a:endParaRPr lang="en-US" dirty="0"/>
                     </a:p>
@@ -12091,7 +12222,7 @@
             <a:pPr lvl="1"/>
             <a:r>
               <a:rPr lang="en-US" dirty="0" smtClean="0"/>
-              <a:t>Over 240,000 training instances</a:t>
+              <a:t>Over 244,000 training instances</a:t>
             </a:r>
           </a:p>
           <a:p>
@@ -12827,6 +12958,36 @@
           </a:p>
         </p:txBody>
       </p:sp>
+      <p:pic>
+        <p:nvPicPr>
+          <p:cNvPr id="4" name="Picture 3" descr="Screen Shot 2013-03-28 at 12.51.30 PM.png"/>
+          <p:cNvPicPr>
+            <a:picLocks noChangeAspect="1"/>
+          </p:cNvPicPr>
+          <p:nvPr/>
+        </p:nvPicPr>
+        <p:blipFill>
+          <a:blip r:embed="rId3">
+            <a:extLst>
+              <a:ext uri="{28A0092B-C50C-407E-A947-70E740481C1C}">
+                <a14:useLocalDpi xmlns:a14="http://schemas.microsoft.com/office/drawing/2010/main" val="0"/>
+              </a:ext>
+            </a:extLst>
+          </a:blip>
+          <a:stretch>
+            <a:fillRect/>
+          </a:stretch>
+        </p:blipFill>
+        <p:spPr>
+          <a:xfrm>
+            <a:off x="3429000" y="3406712"/>
+            <a:ext cx="2286000" cy="2768600"/>
+          </a:xfrm>
+          <a:prstGeom prst="rect">
+            <a:avLst/>
+          </a:prstGeom>
+        </p:spPr>
+      </p:pic>
     </p:spTree>
     <p:extLst>
       <p:ext uri="{BB962C8B-B14F-4D97-AF65-F5344CB8AC3E}">

</xml_diff>